<commit_message>
updated readme and rubocop changes
</commit_message>
<xml_diff>
--- a/CYOA_nimbifer.pptx
+++ b/CYOA_nimbifer.pptx
@@ -785,58 +785,11 @@
           <a:p>
             <a:r>
               <a:rPr lang="en-US" dirty="0"/>
-              <a:t>Consider talking about:</a:t>
-            </a:r>
-          </a:p>
-          <a:p>
-            <a:pPr marL="171450" indent="-171450">
-              <a:buFont typeface="Arial" panose="020B0604020202020204" pitchFamily="34" charset="0"/>
-              <a:buChar char="•"/>
-            </a:pPr>
-            <a:r>
-              <a:rPr lang="en-US" dirty="0"/>
-              <a:t>Puzzle-solving</a:t>
-            </a:r>
-          </a:p>
-          <a:p>
-            <a:pPr marL="171450" indent="-171450">
-              <a:buFont typeface="Arial" panose="020B0604020202020204" pitchFamily="34" charset="0"/>
-              <a:buChar char="•"/>
-            </a:pPr>
-            <a:r>
-              <a:rPr lang="en-US" dirty="0"/>
-              <a:t>Gathering and using items</a:t>
-            </a:r>
-          </a:p>
-          <a:p>
-            <a:pPr marL="171450" indent="-171450">
-              <a:buFont typeface="Arial" panose="020B0604020202020204" pitchFamily="34" charset="0"/>
-              <a:buChar char="•"/>
-            </a:pPr>
-            <a:r>
-              <a:rPr lang="en-US" dirty="0"/>
-              <a:t>Story, setting, and themes</a:t>
-            </a:r>
-          </a:p>
-          <a:p>
-            <a:pPr marL="171450" indent="-171450">
-              <a:buFont typeface="Arial" panose="020B0604020202020204" pitchFamily="34" charset="0"/>
-              <a:buChar char="•"/>
-            </a:pPr>
-            <a:r>
-              <a:rPr lang="en-US" dirty="0"/>
-              <a:t>Dialogue and conversation trees</a:t>
-            </a:r>
-          </a:p>
-          <a:p>
-            <a:pPr marL="171450" indent="-171450">
-              <a:buFont typeface="Arial" panose="020B0604020202020204" pitchFamily="34" charset="0"/>
-              <a:buChar char="•"/>
-            </a:pPr>
-            <a:r>
-              <a:rPr lang="en-US" dirty="0"/>
-              <a:t>Goals, success and failure</a:t>
-            </a:r>
+              <a:t>DRY – methods </a:t>
+            </a:r>
+          </a:p>
+          <a:p>
+            <a:endParaRPr lang="en-US" dirty="0"/>
           </a:p>
         </p:txBody>
       </p:sp>
@@ -5573,6 +5526,36 @@
           </a:p>
         </p:txBody>
       </p:sp>
+      <p:pic>
+        <p:nvPicPr>
+          <p:cNvPr id="5" name="Picture 4">
+            <a:extLst>
+              <a:ext uri="{FF2B5EF4-FFF2-40B4-BE49-F238E27FC236}">
+                <a16:creationId xmlns:a16="http://schemas.microsoft.com/office/drawing/2014/main" id="{D493E97E-CADE-1344-AC95-C265E876A1AF}"/>
+              </a:ext>
+            </a:extLst>
+          </p:cNvPr>
+          <p:cNvPicPr>
+            <a:picLocks noChangeAspect="1"/>
+          </p:cNvPicPr>
+          <p:nvPr/>
+        </p:nvPicPr>
+        <p:blipFill>
+          <a:blip r:embed="rId3"/>
+          <a:stretch>
+            <a:fillRect/>
+          </a:stretch>
+        </p:blipFill>
+        <p:spPr>
+          <a:xfrm>
+            <a:off x="10972005" y="5297199"/>
+            <a:ext cx="1016000" cy="1016000"/>
+          </a:xfrm>
+          <a:prstGeom prst="rect">
+            <a:avLst/>
+          </a:prstGeom>
+        </p:spPr>
+      </p:pic>
     </p:spTree>
     <p:extLst>
       <p:ext uri="{BB962C8B-B14F-4D97-AF65-F5344CB8AC3E}">
@@ -6752,7 +6735,7 @@
         <p:spPr>
           <a:xfrm>
             <a:off x="6927786" y="613720"/>
-            <a:ext cx="4490359" cy="4268965"/>
+            <a:ext cx="4901386" cy="4268965"/>
           </a:xfrm>
         </p:spPr>
         <p:txBody>
@@ -6767,13 +6750,18 @@
               </a:lnSpc>
             </a:pPr>
             <a:r>
-              <a:rPr lang="en-US" sz="4000" cap="all" dirty="0">
+              <a:rPr lang="en-US" sz="4000" cap="all" dirty="0" err="1">
                 <a:solidFill>
                   <a:schemeClr val="tx2"/>
                 </a:solidFill>
               </a:rPr>
-              <a:t>Control Flow</a:t>
-            </a:r>
+              <a:t>Control_Flow</a:t>
+            </a:r>
+            <a:endParaRPr lang="en-US" sz="4000" cap="all" dirty="0">
+              <a:solidFill>
+                <a:schemeClr val="tx2"/>
+              </a:solidFill>
+            </a:endParaRPr>
           </a:p>
         </p:txBody>
       </p:sp>
@@ -8142,7 +8130,7 @@
               </a:rPr>
             </a:br>
             <a:r>
-              <a:rPr lang="en-US" sz="6600" cap="all">
+              <a:rPr lang="en-US" sz="6600" cap="all" dirty="0" err="1">
                 <a:solidFill>
                   <a:schemeClr val="tx2"/>
                 </a:solidFill>

</xml_diff>